<commit_message>
Touch ups on GLibC Malloc slides
* Correct a few wrong things
* A few diagrams
</commit_message>
<xml_diff>
--- a/challenges/vuln_classes/vuln_classes.pptx
+++ b/challenges/vuln_classes/vuln_classes.pptx
@@ -5,7 +5,7 @@
     <p:sldMasterId id="2147483660" r:id="rId1"/>
   </p:sldMasterIdLst>
   <p:notesMasterIdLst>
-    <p:notesMasterId r:id="rId39"/>
+    <p:notesMasterId r:id="rId37"/>
   </p:notesMasterIdLst>
   <p:sldIdLst>
     <p:sldId id="396" r:id="rId2"/>
@@ -14,37 +14,35 @@
     <p:sldId id="398" r:id="rId5"/>
     <p:sldId id="428" r:id="rId6"/>
     <p:sldId id="403" r:id="rId7"/>
-    <p:sldId id="427" r:id="rId8"/>
-    <p:sldId id="436" r:id="rId9"/>
-    <p:sldId id="468" r:id="rId10"/>
-    <p:sldId id="469" r:id="rId11"/>
-    <p:sldId id="471" r:id="rId12"/>
-    <p:sldId id="472" r:id="rId13"/>
-    <p:sldId id="485" r:id="rId14"/>
-    <p:sldId id="473" r:id="rId15"/>
-    <p:sldId id="400" r:id="rId16"/>
-    <p:sldId id="399" r:id="rId17"/>
-    <p:sldId id="429" r:id="rId18"/>
-    <p:sldId id="451" r:id="rId19"/>
-    <p:sldId id="404" r:id="rId20"/>
-    <p:sldId id="483" r:id="rId21"/>
-    <p:sldId id="474" r:id="rId22"/>
-    <p:sldId id="475" r:id="rId23"/>
-    <p:sldId id="477" r:id="rId24"/>
-    <p:sldId id="478" r:id="rId25"/>
-    <p:sldId id="480" r:id="rId26"/>
-    <p:sldId id="479" r:id="rId27"/>
-    <p:sldId id="481" r:id="rId28"/>
-    <p:sldId id="482" r:id="rId29"/>
-    <p:sldId id="484" r:id="rId30"/>
-    <p:sldId id="452" r:id="rId31"/>
-    <p:sldId id="491" r:id="rId32"/>
-    <p:sldId id="502" r:id="rId33"/>
-    <p:sldId id="501" r:id="rId34"/>
-    <p:sldId id="453" r:id="rId35"/>
-    <p:sldId id="493" r:id="rId36"/>
-    <p:sldId id="435" r:id="rId37"/>
-    <p:sldId id="348" r:id="rId38"/>
+    <p:sldId id="436" r:id="rId8"/>
+    <p:sldId id="468" r:id="rId9"/>
+    <p:sldId id="469" r:id="rId10"/>
+    <p:sldId id="471" r:id="rId11"/>
+    <p:sldId id="472" r:id="rId12"/>
+    <p:sldId id="485" r:id="rId13"/>
+    <p:sldId id="473" r:id="rId14"/>
+    <p:sldId id="400" r:id="rId15"/>
+    <p:sldId id="399" r:id="rId16"/>
+    <p:sldId id="429" r:id="rId17"/>
+    <p:sldId id="451" r:id="rId18"/>
+    <p:sldId id="404" r:id="rId19"/>
+    <p:sldId id="474" r:id="rId20"/>
+    <p:sldId id="475" r:id="rId21"/>
+    <p:sldId id="477" r:id="rId22"/>
+    <p:sldId id="478" r:id="rId23"/>
+    <p:sldId id="480" r:id="rId24"/>
+    <p:sldId id="479" r:id="rId25"/>
+    <p:sldId id="481" r:id="rId26"/>
+    <p:sldId id="482" r:id="rId27"/>
+    <p:sldId id="483" r:id="rId28"/>
+    <p:sldId id="452" r:id="rId29"/>
+    <p:sldId id="491" r:id="rId30"/>
+    <p:sldId id="502" r:id="rId31"/>
+    <p:sldId id="501" r:id="rId32"/>
+    <p:sldId id="453" r:id="rId33"/>
+    <p:sldId id="493" r:id="rId34"/>
+    <p:sldId id="435" r:id="rId35"/>
+    <p:sldId id="348" r:id="rId36"/>
   </p:sldIdLst>
   <p:sldSz cx="9144000" cy="5143500" type="screen16x9"/>
   <p:notesSz cx="6858000" cy="9144000"/>
@@ -6010,7 +6008,7 @@
 <dgm:dataModel xmlns:dgm="http://schemas.openxmlformats.org/drawingml/2006/diagram" xmlns:a="http://schemas.openxmlformats.org/drawingml/2006/main">
   <dgm:ptLst>
     <dgm:pt modelId="{749DD776-ED7C-4B4F-8AA5-1FE24F44857D}" type="doc">
-      <dgm:prSet loTypeId="urn:microsoft.com/office/officeart/2005/8/layout/hList1" loCatId="list" qsTypeId="urn:microsoft.com/office/officeart/2005/8/quickstyle/simple2" qsCatId="simple" csTypeId="urn:microsoft.com/office/officeart/2005/8/colors/accent2_2" csCatId="accent2"/>
+      <dgm:prSet loTypeId="urn:microsoft.com/office/officeart/2005/8/layout/hList1" loCatId="list" qsTypeId="urn:microsoft.com/office/officeart/2005/8/quickstyle/simple2" qsCatId="simple" csTypeId="urn:microsoft.com/office/officeart/2005/8/colors/accent2_2" csCatId="accent2" phldr="1"/>
       <dgm:spPr/>
       <dgm:t>
         <a:bodyPr/>
@@ -6028,20 +6026,20 @@
         <a:lstStyle/>
         <a:p>
           <a:r>
-            <a:rPr lang="en-US"/>
+            <a:rPr lang="en-US" dirty="0"/>
             <a:t>Look at </a:t>
           </a:r>
           <a:r>
-            <a:rPr lang="en-US" b="1" i="1"/>
+            <a:rPr lang="en-US" b="1" i="1" dirty="0"/>
             <a:t>heap</a:t>
           </a:r>
           <a:r>
-            <a:rPr lang="en-US" i="1"/>
+            <a:rPr lang="en-US" i="1" dirty="0"/>
             <a:t> </a:t>
           </a:r>
           <a:r>
-            <a:rPr lang="en-US"/>
-            <a:t>specific functions:</a:t>
+            <a:rPr lang="en-US" dirty="0"/>
+            <a:t>specific functions</a:t>
           </a:r>
         </a:p>
       </dgm:t>
@@ -6153,8 +6151,8 @@
         <a:lstStyle/>
         <a:p>
           <a:r>
-            <a:rPr lang="en-US"/>
-            <a:t>Everything else is the same: </a:t>
+            <a:rPr lang="en-US" dirty="0"/>
+            <a:t>Everything else is the same </a:t>
           </a:r>
         </a:p>
       </dgm:t>
@@ -6189,7 +6187,7 @@
         <a:lstStyle/>
         <a:p>
           <a:r>
-            <a:rPr lang="en-US"/>
+            <a:rPr lang="en-US" dirty="0"/>
             <a:t>Bounds Checking…</a:t>
           </a:r>
         </a:p>
@@ -8268,20 +8266,20 @@
             <a:buNone/>
           </a:pPr>
           <a:r>
-            <a:rPr lang="en-US" sz="3400" kern="1200"/>
+            <a:rPr lang="en-US" sz="3400" kern="1200" dirty="0"/>
             <a:t>Look at </a:t>
           </a:r>
           <a:r>
-            <a:rPr lang="en-US" sz="3400" b="1" i="1" kern="1200"/>
+            <a:rPr lang="en-US" sz="3400" b="1" i="1" kern="1200" dirty="0"/>
             <a:t>heap</a:t>
           </a:r>
           <a:r>
-            <a:rPr lang="en-US" sz="3400" i="1" kern="1200"/>
+            <a:rPr lang="en-US" sz="3400" i="1" kern="1200" dirty="0"/>
             <a:t> </a:t>
           </a:r>
           <a:r>
-            <a:rPr lang="en-US" sz="3400" kern="1200"/>
-            <a:t>specific functions:</a:t>
+            <a:rPr lang="en-US" sz="3400" kern="1200" dirty="0"/>
+            <a:t>specific functions</a:t>
           </a:r>
         </a:p>
       </dsp:txBody>
@@ -8461,8 +8459,8 @@
             <a:buNone/>
           </a:pPr>
           <a:r>
-            <a:rPr lang="en-US" sz="3400" kern="1200"/>
-            <a:t>Everything else is the same: </a:t>
+            <a:rPr lang="en-US" sz="3400" kern="1200" dirty="0"/>
+            <a:t>Everything else is the same </a:t>
           </a:r>
         </a:p>
       </dsp:txBody>
@@ -8541,7 +8539,7 @@
             <a:buChar char="•"/>
           </a:pPr>
           <a:r>
-            <a:rPr lang="en-US" sz="3400" kern="1200"/>
+            <a:rPr lang="en-US" sz="3400" kern="1200" dirty="0"/>
             <a:t>Bounds Checking…</a:t>
           </a:r>
         </a:p>
@@ -16014,7 +16012,7 @@
           <a:p>
             <a:fld id="{2DA23E8D-1792-1541-9147-970A8DD8A355}" type="datetimeFigureOut">
               <a:rPr lang="en-US" smtClean="0"/>
-              <a:t>3/28/21</a:t>
+              <a:t>4/25/21</a:t>
             </a:fld>
             <a:endParaRPr lang="en-US" dirty="0"/>
           </a:p>
@@ -16484,7 +16482,7 @@
                 <a:latin typeface="Calibri"/>
               </a:rPr>
               <a:pPr/>
-              <a:t>3/28/21</a:t>
+              <a:t>4/25/21</a:t>
             </a:fld>
             <a:endParaRPr lang="en-US" dirty="0">
               <a:solidFill>
@@ -16737,7 +16735,7 @@
                 <a:latin typeface="Calibri"/>
               </a:rPr>
               <a:pPr/>
-              <a:t>3/28/21</a:t>
+              <a:t>4/25/21</a:t>
             </a:fld>
             <a:endParaRPr lang="en-US" dirty="0">
               <a:solidFill>
@@ -16952,7 +16950,7 @@
                 <a:latin typeface="Calibri"/>
               </a:rPr>
               <a:pPr/>
-              <a:t>3/28/21</a:t>
+              <a:t>4/25/21</a:t>
             </a:fld>
             <a:endParaRPr lang="en-US" dirty="0">
               <a:solidFill>
@@ -17236,7 +17234,7 @@
                 <a:latin typeface="Calibri"/>
               </a:rPr>
               <a:pPr/>
-              <a:t>3/28/21</a:t>
+              <a:t>4/25/21</a:t>
             </a:fld>
             <a:endParaRPr lang="en-US" dirty="0">
               <a:solidFill>
@@ -17578,7 +17576,7 @@
                 <a:latin typeface="Calibri"/>
               </a:rPr>
               <a:pPr/>
-              <a:t>3/28/21</a:t>
+              <a:t>4/25/21</a:t>
             </a:fld>
             <a:endParaRPr lang="en-US" dirty="0">
               <a:solidFill>
@@ -17906,7 +17904,7 @@
                 <a:latin typeface="Calibri"/>
               </a:rPr>
               <a:pPr/>
-              <a:t>3/28/21</a:t>
+              <a:t>4/25/21</a:t>
             </a:fld>
             <a:endParaRPr lang="en-US" dirty="0">
               <a:solidFill>
@@ -18395,7 +18393,7 @@
                 <a:latin typeface="Calibri"/>
               </a:rPr>
               <a:pPr/>
-              <a:t>3/28/21</a:t>
+              <a:t>4/25/21</a:t>
             </a:fld>
             <a:endParaRPr lang="en-US" dirty="0">
               <a:solidFill>
@@ -18578,7 +18576,7 @@
                 <a:latin typeface="Calibri"/>
               </a:rPr>
               <a:pPr/>
-              <a:t>3/28/21</a:t>
+              <a:t>4/25/21</a:t>
             </a:fld>
             <a:endParaRPr lang="en-US" dirty="0">
               <a:solidFill>
@@ -18824,7 +18822,7 @@
                 <a:latin typeface="Calibri"/>
               </a:rPr>
               <a:pPr/>
-              <a:t>3/28/21</a:t>
+              <a:t>4/25/21</a:t>
             </a:fld>
             <a:endParaRPr lang="en-US" dirty="0">
               <a:solidFill>
@@ -19166,7 +19164,7 @@
                 <a:latin typeface="Calibri"/>
               </a:rPr>
               <a:pPr/>
-              <a:t>3/28/21</a:t>
+              <a:t>4/25/21</a:t>
             </a:fld>
             <a:endParaRPr lang="en-US" dirty="0">
               <a:solidFill>
@@ -19458,7 +19456,7 @@
                 <a:latin typeface="Calibri"/>
               </a:rPr>
               <a:pPr/>
-              <a:t>3/28/21</a:t>
+              <a:t>4/25/21</a:t>
             </a:fld>
             <a:endParaRPr lang="en-US" dirty="0">
               <a:solidFill>
@@ -19708,7 +19706,7 @@
                 <a:latin typeface="Calibri"/>
               </a:rPr>
               <a:pPr defTabSz="914400"/>
-              <a:t>3/28/21</a:t>
+              <a:t>4/25/21</a:t>
             </a:fld>
             <a:endParaRPr lang="en-US" dirty="0">
               <a:solidFill>
@@ -20289,142 +20287,6 @@
           <a:p>
             <a:r>
               <a:rPr lang="en-US" dirty="0"/>
-              <a:t>UAF – Solution Diagram 3</a:t>
-            </a:r>
-          </a:p>
-        </p:txBody>
-      </p:sp>
-      <p:sp>
-        <p:nvSpPr>
-          <p:cNvPr id="3" name="Content Placeholder 2">
-            <a:extLst>
-              <a:ext uri="{FF2B5EF4-FFF2-40B4-BE49-F238E27FC236}">
-                <a16:creationId xmlns:a16="http://schemas.microsoft.com/office/drawing/2014/main" id="{7F271F73-3DDC-104B-BA9C-1D75C1191326}"/>
-              </a:ext>
-            </a:extLst>
-          </p:cNvPr>
-          <p:cNvSpPr>
-            <a:spLocks noGrp="1"/>
-          </p:cNvSpPr>
-          <p:nvPr>
-            <p:ph sz="half" idx="1"/>
-          </p:nvPr>
-        </p:nvSpPr>
-        <p:spPr>
-          <a:xfrm>
-            <a:off x="628650" y="1369219"/>
-            <a:ext cx="3886200" cy="3263504"/>
-          </a:xfrm>
-        </p:spPr>
-        <p:txBody>
-          <a:bodyPr>
-            <a:normAutofit/>
-          </a:bodyPr>
-          <a:lstStyle/>
-          <a:p>
-            <a:r>
-              <a:rPr lang="en-US" dirty="0"/>
-              <a:t>Play</a:t>
-            </a:r>
-          </a:p>
-          <a:p>
-            <a:r>
-              <a:rPr lang="en-US" dirty="0"/>
-              <a:t>Allocates a chunk of size 0x20</a:t>
-            </a:r>
-          </a:p>
-        </p:txBody>
-      </p:sp>
-      <p:pic>
-        <p:nvPicPr>
-          <p:cNvPr id="5" name="Picture 4" descr="Allocate the 'parray'">
-            <a:extLst>
-              <a:ext uri="{FF2B5EF4-FFF2-40B4-BE49-F238E27FC236}">
-                <a16:creationId xmlns:a16="http://schemas.microsoft.com/office/drawing/2014/main" id="{5B680900-BB7C-D940-AE9C-CE6E80094A68}"/>
-              </a:ext>
-            </a:extLst>
-          </p:cNvPr>
-          <p:cNvPicPr>
-            <a:picLocks noChangeAspect="1"/>
-          </p:cNvPicPr>
-          <p:nvPr/>
-        </p:nvPicPr>
-        <p:blipFill>
-          <a:blip r:embed="rId2"/>
-          <a:stretch>
-            <a:fillRect/>
-          </a:stretch>
-        </p:blipFill>
-        <p:spPr>
-          <a:xfrm>
-            <a:off x="4244613" y="1268018"/>
-            <a:ext cx="3579633" cy="3272807"/>
-          </a:xfrm>
-          <a:prstGeom prst="rect">
-            <a:avLst/>
-          </a:prstGeom>
-        </p:spPr>
-      </p:pic>
-    </p:spTree>
-    <p:extLst>
-      <p:ext uri="{BB962C8B-B14F-4D97-AF65-F5344CB8AC3E}">
-        <p14:creationId xmlns:p14="http://schemas.microsoft.com/office/powerpoint/2010/main" val="3216247816"/>
-      </p:ext>
-    </p:extLst>
-  </p:cSld>
-  <p:clrMapOvr>
-    <a:masterClrMapping/>
-  </p:clrMapOvr>
-</p:sld>
-</file>
-
-<file path=ppt/slides/slide11.xml><?xml version="1.0" encoding="utf-8"?>
-<p:sld xmlns:a="http://schemas.openxmlformats.org/drawingml/2006/main" xmlns:r="http://schemas.openxmlformats.org/officeDocument/2006/relationships" xmlns:p="http://schemas.openxmlformats.org/presentationml/2006/main">
-  <p:cSld>
-    <p:spTree>
-      <p:nvGrpSpPr>
-        <p:cNvPr id="1" name=""/>
-        <p:cNvGrpSpPr/>
-        <p:nvPr/>
-      </p:nvGrpSpPr>
-      <p:grpSpPr>
-        <a:xfrm>
-          <a:off x="0" y="0"/>
-          <a:ext cx="0" cy="0"/>
-          <a:chOff x="0" y="0"/>
-          <a:chExt cx="0" cy="0"/>
-        </a:xfrm>
-      </p:grpSpPr>
-      <p:sp>
-        <p:nvSpPr>
-          <p:cNvPr id="2" name="Title 1">
-            <a:extLst>
-              <a:ext uri="{FF2B5EF4-FFF2-40B4-BE49-F238E27FC236}">
-                <a16:creationId xmlns:a16="http://schemas.microsoft.com/office/drawing/2014/main" id="{08506B2A-1853-DC4C-8F91-DA7FFFFD7CD8}"/>
-              </a:ext>
-            </a:extLst>
-          </p:cNvPr>
-          <p:cNvSpPr>
-            <a:spLocks noGrp="1"/>
-          </p:cNvSpPr>
-          <p:nvPr>
-            <p:ph type="title"/>
-          </p:nvPr>
-        </p:nvSpPr>
-        <p:spPr>
-          <a:xfrm>
-            <a:off x="628650" y="273847"/>
-            <a:ext cx="7886700" cy="994172"/>
-          </a:xfrm>
-        </p:spPr>
-        <p:txBody>
-          <a:bodyPr anchor="ctr">
-            <a:normAutofit/>
-          </a:bodyPr>
-          <a:lstStyle/>
-          <a:p>
-            <a:r>
-              <a:rPr lang="en-US" dirty="0"/>
               <a:t>UAF – Solution Diagram 4</a:t>
             </a:r>
           </a:p>
@@ -20549,7 +20411,7 @@
 </p:sld>
 </file>
 
-<file path=ppt/slides/slide12.xml><?xml version="1.0" encoding="utf-8"?>
+<file path=ppt/slides/slide11.xml><?xml version="1.0" encoding="utf-8"?>
 <p:sld xmlns:a="http://schemas.openxmlformats.org/drawingml/2006/main" xmlns:r="http://schemas.openxmlformats.org/officeDocument/2006/relationships" xmlns:p="http://schemas.openxmlformats.org/presentationml/2006/main">
   <p:cSld>
     <p:spTree>
@@ -20709,7 +20571,7 @@
 </p:sld>
 </file>
 
-<file path=ppt/slides/slide13.xml><?xml version="1.0" encoding="utf-8"?>
+<file path=ppt/slides/slide12.xml><?xml version="1.0" encoding="utf-8"?>
 <p:sld xmlns:a="http://schemas.openxmlformats.org/drawingml/2006/main" xmlns:r="http://schemas.openxmlformats.org/officeDocument/2006/relationships" xmlns:p="http://schemas.openxmlformats.org/presentationml/2006/main">
   <p:cSld>
     <p:spTree>
@@ -20862,7 +20724,7 @@
 </p:sld>
 </file>
 
-<file path=ppt/slides/slide14.xml><?xml version="1.0" encoding="utf-8"?>
+<file path=ppt/slides/slide13.xml><?xml version="1.0" encoding="utf-8"?>
 <p:sld xmlns:a="http://schemas.openxmlformats.org/drawingml/2006/main" xmlns:r="http://schemas.openxmlformats.org/officeDocument/2006/relationships" xmlns:p="http://schemas.openxmlformats.org/presentationml/2006/main">
   <p:cSld>
     <p:spTree>
@@ -20958,7 +20820,7 @@
 </p:sld>
 </file>
 
-<file path=ppt/slides/slide15.xml><?xml version="1.0" encoding="utf-8"?>
+<file path=ppt/slides/slide14.xml><?xml version="1.0" encoding="utf-8"?>
 <p:sld xmlns:a="http://schemas.openxmlformats.org/drawingml/2006/main" xmlns:r="http://schemas.openxmlformats.org/officeDocument/2006/relationships" xmlns:p="http://schemas.openxmlformats.org/presentationml/2006/main">
   <p:cSld>
     <p:spTree>
@@ -21089,7 +20951,7 @@
 </p:sld>
 </file>
 
-<file path=ppt/slides/slide16.xml><?xml version="1.0" encoding="utf-8"?>
+<file path=ppt/slides/slide15.xml><?xml version="1.0" encoding="utf-8"?>
 <p:sld xmlns:a="http://schemas.openxmlformats.org/drawingml/2006/main" xmlns:r="http://schemas.openxmlformats.org/officeDocument/2006/relationships" xmlns:p="http://schemas.openxmlformats.org/presentationml/2006/main">
   <p:cSld>
     <p:spTree>
@@ -21330,7 +21192,7 @@
 </p:sld>
 </file>
 
-<file path=ppt/slides/slide17.xml><?xml version="1.0" encoding="utf-8"?>
+<file path=ppt/slides/slide16.xml><?xml version="1.0" encoding="utf-8"?>
 <p:sld xmlns:a="http://schemas.openxmlformats.org/drawingml/2006/main" xmlns:r="http://schemas.openxmlformats.org/officeDocument/2006/relationships" xmlns:p="http://schemas.openxmlformats.org/presentationml/2006/main">
   <p:cSld>
     <p:spTree>
@@ -21478,7 +21340,7 @@
 </p:sld>
 </file>
 
-<file path=ppt/slides/slide18.xml><?xml version="1.0" encoding="utf-8"?>
+<file path=ppt/slides/slide17.xml><?xml version="1.0" encoding="utf-8"?>
 <p:sld xmlns:a="http://schemas.openxmlformats.org/drawingml/2006/main" xmlns:r="http://schemas.openxmlformats.org/officeDocument/2006/relationships" xmlns:p="http://schemas.openxmlformats.org/presentationml/2006/main">
   <p:cSld>
     <p:spTree>
@@ -21621,7 +21483,7 @@
 </p:sld>
 </file>
 
-<file path=ppt/slides/slide19.xml><?xml version="1.0" encoding="utf-8"?>
+<file path=ppt/slides/slide18.xml><?xml version="1.0" encoding="utf-8"?>
 <p:sld xmlns:a="http://schemas.openxmlformats.org/drawingml/2006/main" xmlns:r="http://schemas.openxmlformats.org/officeDocument/2006/relationships" xmlns:p="http://schemas.openxmlformats.org/presentationml/2006/main">
   <p:cSld>
     <p:spTree>
@@ -21685,7 +21547,7 @@
         <p:spPr/>
         <p:txBody>
           <a:bodyPr>
-            <a:normAutofit fontScale="92500" lnSpcReduction="20000"/>
+            <a:normAutofit fontScale="85000" lnSpcReduction="20000"/>
           </a:bodyPr>
           <a:lstStyle/>
           <a:p>
@@ -21771,7 +21633,15 @@
             </a:r>
             <a:r>
               <a:rPr lang="en-US" dirty="0"/>
-              <a:t> high score to be set</a:t>
+              <a:t> high score to be set (don’t need this for </a:t>
+            </a:r>
+            <a:r>
+              <a:rPr lang="en-US" dirty="0" err="1"/>
+              <a:t>pwn</a:t>
+            </a:r>
+            <a:r>
+              <a:rPr lang="en-US" dirty="0"/>
+              <a:t>!) </a:t>
             </a:r>
           </a:p>
           <a:p>
@@ -21805,6 +21675,12 @@
             <a:r>
               <a:rPr lang="en-US" dirty="0"/>
               <a:t> struct</a:t>
+            </a:r>
+          </a:p>
+          <a:p>
+            <a:r>
+              <a:rPr lang="en-US" dirty="0"/>
+              <a:t>Hint: Similar to UAF challenge</a:t>
             </a:r>
           </a:p>
         </p:txBody>
@@ -21813,6 +21689,137 @@
     <p:extLst>
       <p:ext uri="{BB962C8B-B14F-4D97-AF65-F5344CB8AC3E}">
         <p14:creationId xmlns:p14="http://schemas.microsoft.com/office/powerpoint/2010/main" val="2951838982"/>
+      </p:ext>
+    </p:extLst>
+  </p:cSld>
+  <p:clrMapOvr>
+    <a:masterClrMapping/>
+  </p:clrMapOvr>
+</p:sld>
+</file>
+
+<file path=ppt/slides/slide19.xml><?xml version="1.0" encoding="utf-8"?>
+<p:sld xmlns:a="http://schemas.openxmlformats.org/drawingml/2006/main" xmlns:r="http://schemas.openxmlformats.org/officeDocument/2006/relationships" xmlns:p="http://schemas.openxmlformats.org/presentationml/2006/main">
+  <p:cSld>
+    <p:spTree>
+      <p:nvGrpSpPr>
+        <p:cNvPr id="1" name=""/>
+        <p:cNvGrpSpPr/>
+        <p:nvPr/>
+      </p:nvGrpSpPr>
+      <p:grpSpPr>
+        <a:xfrm>
+          <a:off x="0" y="0"/>
+          <a:ext cx="0" cy="0"/>
+          <a:chOff x="0" y="0"/>
+          <a:chExt cx="0" cy="0"/>
+        </a:xfrm>
+      </p:grpSpPr>
+      <p:sp>
+        <p:nvSpPr>
+          <p:cNvPr id="2" name="Title 1">
+            <a:extLst>
+              <a:ext uri="{FF2B5EF4-FFF2-40B4-BE49-F238E27FC236}">
+                <a16:creationId xmlns:a16="http://schemas.microsoft.com/office/drawing/2014/main" id="{08506B2A-1853-DC4C-8F91-DA7FFFFD7CD8}"/>
+              </a:ext>
+            </a:extLst>
+          </p:cNvPr>
+          <p:cNvSpPr>
+            <a:spLocks noGrp="1"/>
+          </p:cNvSpPr>
+          <p:nvPr>
+            <p:ph type="title"/>
+          </p:nvPr>
+        </p:nvSpPr>
+        <p:spPr>
+          <a:xfrm>
+            <a:off x="628650" y="273847"/>
+            <a:ext cx="8392802" cy="994172"/>
+          </a:xfrm>
+        </p:spPr>
+        <p:txBody>
+          <a:bodyPr anchor="ctr">
+            <a:normAutofit fontScale="90000"/>
+          </a:bodyPr>
+          <a:lstStyle/>
+          <a:p>
+            <a:r>
+              <a:rPr lang="en-US" dirty="0"/>
+              <a:t>Double Free – Solution Diagram 1</a:t>
+            </a:r>
+          </a:p>
+        </p:txBody>
+      </p:sp>
+      <p:sp>
+        <p:nvSpPr>
+          <p:cNvPr id="3" name="Content Placeholder 2">
+            <a:extLst>
+              <a:ext uri="{FF2B5EF4-FFF2-40B4-BE49-F238E27FC236}">
+                <a16:creationId xmlns:a16="http://schemas.microsoft.com/office/drawing/2014/main" id="{7F271F73-3DDC-104B-BA9C-1D75C1191326}"/>
+              </a:ext>
+            </a:extLst>
+          </p:cNvPr>
+          <p:cNvSpPr>
+            <a:spLocks noGrp="1"/>
+          </p:cNvSpPr>
+          <p:nvPr>
+            <p:ph sz="half" idx="1"/>
+          </p:nvPr>
+        </p:nvSpPr>
+        <p:spPr>
+          <a:xfrm>
+            <a:off x="628650" y="1369219"/>
+            <a:ext cx="3886200" cy="3263504"/>
+          </a:xfrm>
+        </p:spPr>
+        <p:txBody>
+          <a:bodyPr>
+            <a:normAutofit/>
+          </a:bodyPr>
+          <a:lstStyle/>
+          <a:p>
+            <a:r>
+              <a:rPr lang="en-US" dirty="0"/>
+              <a:t>Allocate a player</a:t>
+            </a:r>
+          </a:p>
+        </p:txBody>
+      </p:sp>
+      <p:pic>
+        <p:nvPicPr>
+          <p:cNvPr id="5" name="Picture 4" descr="Diagram&#10;&#10;Description automatically generated">
+            <a:extLst>
+              <a:ext uri="{FF2B5EF4-FFF2-40B4-BE49-F238E27FC236}">
+                <a16:creationId xmlns:a16="http://schemas.microsoft.com/office/drawing/2014/main" id="{74FCBF0C-D21E-6A4B-BAFE-2A17B6B17FE6}"/>
+              </a:ext>
+            </a:extLst>
+          </p:cNvPr>
+          <p:cNvPicPr>
+            <a:picLocks noChangeAspect="1"/>
+          </p:cNvPicPr>
+          <p:nvPr/>
+        </p:nvPicPr>
+        <p:blipFill>
+          <a:blip r:embed="rId2"/>
+          <a:stretch>
+            <a:fillRect/>
+          </a:stretch>
+        </p:blipFill>
+        <p:spPr>
+          <a:xfrm>
+            <a:off x="4629150" y="1438395"/>
+            <a:ext cx="3886200" cy="3125152"/>
+          </a:xfrm>
+          <a:prstGeom prst="rect">
+            <a:avLst/>
+          </a:prstGeom>
+          <a:noFill/>
+        </p:spPr>
+      </p:pic>
+    </p:spTree>
+    <p:extLst>
+      <p:ext uri="{BB962C8B-B14F-4D97-AF65-F5344CB8AC3E}">
+        <p14:creationId xmlns:p14="http://schemas.microsoft.com/office/powerpoint/2010/main" val="2053745661"/>
       </p:ext>
     </p:extLst>
   </p:cSld>
@@ -22008,321 +22015,6 @@
           <p:cNvPr id="2" name="Title 1">
             <a:extLst>
               <a:ext uri="{FF2B5EF4-FFF2-40B4-BE49-F238E27FC236}">
-                <a16:creationId xmlns:a16="http://schemas.microsoft.com/office/drawing/2014/main" id="{1428FE6B-A844-4B4E-9A09-DCC5558672AA}"/>
-              </a:ext>
-            </a:extLst>
-          </p:cNvPr>
-          <p:cNvSpPr>
-            <a:spLocks noGrp="1"/>
-          </p:cNvSpPr>
-          <p:nvPr>
-            <p:ph type="title"/>
-          </p:nvPr>
-        </p:nvSpPr>
-        <p:spPr/>
-        <p:txBody>
-          <a:bodyPr/>
-          <a:lstStyle/>
-          <a:p>
-            <a:r>
-              <a:rPr lang="en-US" dirty="0"/>
-              <a:t>Double Free - Solution</a:t>
-            </a:r>
-          </a:p>
-        </p:txBody>
-      </p:sp>
-      <p:sp>
-        <p:nvSpPr>
-          <p:cNvPr id="4" name="Content Placeholder 2">
-            <a:extLst>
-              <a:ext uri="{FF2B5EF4-FFF2-40B4-BE49-F238E27FC236}">
-                <a16:creationId xmlns:a16="http://schemas.microsoft.com/office/drawing/2014/main" id="{3B238808-171A-7646-A4D3-46EDF4528CAE}"/>
-              </a:ext>
-            </a:extLst>
-          </p:cNvPr>
-          <p:cNvSpPr>
-            <a:spLocks noGrp="1"/>
-          </p:cNvSpPr>
-          <p:nvPr>
-            <p:ph idx="1"/>
-          </p:nvPr>
-        </p:nvSpPr>
-        <p:spPr>
-          <a:xfrm>
-            <a:off x="628650" y="1236541"/>
-            <a:ext cx="8355094" cy="3263504"/>
-          </a:xfrm>
-        </p:spPr>
-        <p:txBody>
-          <a:bodyPr>
-            <a:normAutofit/>
-          </a:bodyPr>
-          <a:lstStyle/>
-          <a:p>
-            <a:r>
-              <a:rPr lang="en-US" dirty="0"/>
-              <a:t>Create User </a:t>
-            </a:r>
-            <a:r>
-              <a:rPr lang="en-US" dirty="0">
-                <a:sym typeface="Wingdings" pitchFamily="2" charset="2"/>
-              </a:rPr>
-              <a:t> Allocates a malloc chunk</a:t>
-            </a:r>
-            <a:endParaRPr lang="en-US" dirty="0"/>
-          </a:p>
-          <a:p>
-            <a:r>
-              <a:rPr lang="en-US" dirty="0"/>
-              <a:t>Reset User </a:t>
-            </a:r>
-            <a:r>
-              <a:rPr lang="en-US" dirty="0">
-                <a:sym typeface="Wingdings" pitchFamily="2" charset="2"/>
-              </a:rPr>
-              <a:t> Frees a malloc chunk</a:t>
-            </a:r>
-          </a:p>
-          <a:p>
-            <a:r>
-              <a:rPr lang="en-US" dirty="0"/>
-              <a:t>Reset User </a:t>
-            </a:r>
-            <a:r>
-              <a:rPr lang="en-US" dirty="0">
-                <a:sym typeface="Wingdings" pitchFamily="2" charset="2"/>
-              </a:rPr>
-              <a:t> Frees a malloc chunk</a:t>
-            </a:r>
-          </a:p>
-          <a:p>
-            <a:r>
-              <a:rPr lang="en-US" dirty="0"/>
-              <a:t>Create User </a:t>
-            </a:r>
-            <a:r>
-              <a:rPr lang="en-US" dirty="0">
-                <a:sym typeface="Wingdings" pitchFamily="2" charset="2"/>
-              </a:rPr>
-              <a:t> Allocates a malloc chunk (1 still in bin)</a:t>
-            </a:r>
-            <a:endParaRPr lang="en-US" dirty="0"/>
-          </a:p>
-          <a:p>
-            <a:r>
-              <a:rPr lang="en-US" dirty="0"/>
-              <a:t>Play </a:t>
-            </a:r>
-            <a:r>
-              <a:rPr lang="en-US" dirty="0">
-                <a:sym typeface="Wingdings" pitchFamily="2" charset="2"/>
-              </a:rPr>
-              <a:t> Allocates a malloc chunk (uses same chunk as previous allocation) </a:t>
-            </a:r>
-          </a:p>
-          <a:p>
-            <a:r>
-              <a:rPr lang="en-US" dirty="0"/>
-              <a:t>Win </a:t>
-            </a:r>
-            <a:r>
-              <a:rPr lang="en-US" dirty="0">
-                <a:sym typeface="Wingdings" pitchFamily="2" charset="2"/>
-              </a:rPr>
-              <a:t> Score is at </a:t>
-            </a:r>
-            <a:r>
-              <a:rPr lang="en-US" b="1" i="1" dirty="0">
-                <a:sym typeface="Wingdings" pitchFamily="2" charset="2"/>
-              </a:rPr>
-              <a:t>103</a:t>
-            </a:r>
-            <a:r>
-              <a:rPr lang="en-US" b="1" dirty="0">
-                <a:sym typeface="Wingdings" pitchFamily="2" charset="2"/>
-              </a:rPr>
-              <a:t> </a:t>
-            </a:r>
-            <a:r>
-              <a:rPr lang="en-US" dirty="0">
-                <a:sym typeface="Wingdings" pitchFamily="2" charset="2"/>
-              </a:rPr>
-              <a:t>from the ‘play’ calculations</a:t>
-            </a:r>
-            <a:endParaRPr lang="en-US" dirty="0"/>
-          </a:p>
-          <a:p>
-            <a:pPr lvl="1"/>
-            <a:endParaRPr lang="en-US" dirty="0"/>
-          </a:p>
-        </p:txBody>
-      </p:sp>
-    </p:spTree>
-    <p:extLst>
-      <p:ext uri="{BB962C8B-B14F-4D97-AF65-F5344CB8AC3E}">
-        <p14:creationId xmlns:p14="http://schemas.microsoft.com/office/powerpoint/2010/main" val="346481195"/>
-      </p:ext>
-    </p:extLst>
-  </p:cSld>
-  <p:clrMapOvr>
-    <a:masterClrMapping/>
-  </p:clrMapOvr>
-</p:sld>
-</file>
-
-<file path=ppt/slides/slide21.xml><?xml version="1.0" encoding="utf-8"?>
-<p:sld xmlns:a="http://schemas.openxmlformats.org/drawingml/2006/main" xmlns:r="http://schemas.openxmlformats.org/officeDocument/2006/relationships" xmlns:p="http://schemas.openxmlformats.org/presentationml/2006/main">
-  <p:cSld>
-    <p:spTree>
-      <p:nvGrpSpPr>
-        <p:cNvPr id="1" name=""/>
-        <p:cNvGrpSpPr/>
-        <p:nvPr/>
-      </p:nvGrpSpPr>
-      <p:grpSpPr>
-        <a:xfrm>
-          <a:off x="0" y="0"/>
-          <a:ext cx="0" cy="0"/>
-          <a:chOff x="0" y="0"/>
-          <a:chExt cx="0" cy="0"/>
-        </a:xfrm>
-      </p:grpSpPr>
-      <p:sp>
-        <p:nvSpPr>
-          <p:cNvPr id="2" name="Title 1">
-            <a:extLst>
-              <a:ext uri="{FF2B5EF4-FFF2-40B4-BE49-F238E27FC236}">
-                <a16:creationId xmlns:a16="http://schemas.microsoft.com/office/drawing/2014/main" id="{08506B2A-1853-DC4C-8F91-DA7FFFFD7CD8}"/>
-              </a:ext>
-            </a:extLst>
-          </p:cNvPr>
-          <p:cNvSpPr>
-            <a:spLocks noGrp="1"/>
-          </p:cNvSpPr>
-          <p:nvPr>
-            <p:ph type="title"/>
-          </p:nvPr>
-        </p:nvSpPr>
-        <p:spPr>
-          <a:xfrm>
-            <a:off x="628650" y="273847"/>
-            <a:ext cx="8392802" cy="994172"/>
-          </a:xfrm>
-        </p:spPr>
-        <p:txBody>
-          <a:bodyPr anchor="ctr">
-            <a:normAutofit fontScale="90000"/>
-          </a:bodyPr>
-          <a:lstStyle/>
-          <a:p>
-            <a:r>
-              <a:rPr lang="en-US" dirty="0"/>
-              <a:t>Double Free – Solution Diagram 1</a:t>
-            </a:r>
-          </a:p>
-        </p:txBody>
-      </p:sp>
-      <p:sp>
-        <p:nvSpPr>
-          <p:cNvPr id="3" name="Content Placeholder 2">
-            <a:extLst>
-              <a:ext uri="{FF2B5EF4-FFF2-40B4-BE49-F238E27FC236}">
-                <a16:creationId xmlns:a16="http://schemas.microsoft.com/office/drawing/2014/main" id="{7F271F73-3DDC-104B-BA9C-1D75C1191326}"/>
-              </a:ext>
-            </a:extLst>
-          </p:cNvPr>
-          <p:cNvSpPr>
-            <a:spLocks noGrp="1"/>
-          </p:cNvSpPr>
-          <p:nvPr>
-            <p:ph sz="half" idx="1"/>
-          </p:nvPr>
-        </p:nvSpPr>
-        <p:spPr>
-          <a:xfrm>
-            <a:off x="628650" y="1369219"/>
-            <a:ext cx="3886200" cy="3263504"/>
-          </a:xfrm>
-        </p:spPr>
-        <p:txBody>
-          <a:bodyPr>
-            <a:normAutofit/>
-          </a:bodyPr>
-          <a:lstStyle/>
-          <a:p>
-            <a:r>
-              <a:rPr lang="en-US" dirty="0"/>
-              <a:t>Allocate a player</a:t>
-            </a:r>
-          </a:p>
-        </p:txBody>
-      </p:sp>
-      <p:pic>
-        <p:nvPicPr>
-          <p:cNvPr id="5" name="Picture 4" descr="Diagram&#10;&#10;Description automatically generated">
-            <a:extLst>
-              <a:ext uri="{FF2B5EF4-FFF2-40B4-BE49-F238E27FC236}">
-                <a16:creationId xmlns:a16="http://schemas.microsoft.com/office/drawing/2014/main" id="{74FCBF0C-D21E-6A4B-BAFE-2A17B6B17FE6}"/>
-              </a:ext>
-            </a:extLst>
-          </p:cNvPr>
-          <p:cNvPicPr>
-            <a:picLocks noChangeAspect="1"/>
-          </p:cNvPicPr>
-          <p:nvPr/>
-        </p:nvPicPr>
-        <p:blipFill>
-          <a:blip r:embed="rId2"/>
-          <a:stretch>
-            <a:fillRect/>
-          </a:stretch>
-        </p:blipFill>
-        <p:spPr>
-          <a:xfrm>
-            <a:off x="4629150" y="1438395"/>
-            <a:ext cx="3886200" cy="3125152"/>
-          </a:xfrm>
-          <a:prstGeom prst="rect">
-            <a:avLst/>
-          </a:prstGeom>
-          <a:noFill/>
-        </p:spPr>
-      </p:pic>
-    </p:spTree>
-    <p:extLst>
-      <p:ext uri="{BB962C8B-B14F-4D97-AF65-F5344CB8AC3E}">
-        <p14:creationId xmlns:p14="http://schemas.microsoft.com/office/powerpoint/2010/main" val="2053745661"/>
-      </p:ext>
-    </p:extLst>
-  </p:cSld>
-  <p:clrMapOvr>
-    <a:masterClrMapping/>
-  </p:clrMapOvr>
-</p:sld>
-</file>
-
-<file path=ppt/slides/slide22.xml><?xml version="1.0" encoding="utf-8"?>
-<p:sld xmlns:a="http://schemas.openxmlformats.org/drawingml/2006/main" xmlns:r="http://schemas.openxmlformats.org/officeDocument/2006/relationships" xmlns:p="http://schemas.openxmlformats.org/presentationml/2006/main">
-  <p:cSld>
-    <p:spTree>
-      <p:nvGrpSpPr>
-        <p:cNvPr id="1" name=""/>
-        <p:cNvGrpSpPr/>
-        <p:nvPr/>
-      </p:nvGrpSpPr>
-      <p:grpSpPr>
-        <a:xfrm>
-          <a:off x="0" y="0"/>
-          <a:ext cx="0" cy="0"/>
-          <a:chOff x="0" y="0"/>
-          <a:chExt cx="0" cy="0"/>
-        </a:xfrm>
-      </p:grpSpPr>
-      <p:sp>
-        <p:nvSpPr>
-          <p:cNvPr id="2" name="Title 1">
-            <a:extLst>
-              <a:ext uri="{FF2B5EF4-FFF2-40B4-BE49-F238E27FC236}">
                 <a16:creationId xmlns:a16="http://schemas.microsoft.com/office/drawing/2014/main" id="{08506B2A-1853-DC4C-8F91-DA7FFFFD7CD8}"/>
               </a:ext>
             </a:extLst>
@@ -22445,7 +22137,7 @@
 </p:sld>
 </file>
 
-<file path=ppt/slides/slide23.xml><?xml version="1.0" encoding="utf-8"?>
+<file path=ppt/slides/slide21.xml><?xml version="1.0" encoding="utf-8"?>
 <p:sld xmlns:a="http://schemas.openxmlformats.org/drawingml/2006/main" xmlns:r="http://schemas.openxmlformats.org/officeDocument/2006/relationships" xmlns:p="http://schemas.openxmlformats.org/presentationml/2006/main">
   <p:cSld>
     <p:spTree>
@@ -22589,7 +22281,7 @@
 </p:sld>
 </file>
 
-<file path=ppt/slides/slide24.xml><?xml version="1.0" encoding="utf-8"?>
+<file path=ppt/slides/slide22.xml><?xml version="1.0" encoding="utf-8"?>
 <p:sld xmlns:a="http://schemas.openxmlformats.org/drawingml/2006/main" xmlns:r="http://schemas.openxmlformats.org/officeDocument/2006/relationships" xmlns:p="http://schemas.openxmlformats.org/presentationml/2006/main">
   <p:cSld>
     <p:spTree>
@@ -22745,7 +22437,7 @@
 </p:sld>
 </file>
 
-<file path=ppt/slides/slide25.xml><?xml version="1.0" encoding="utf-8"?>
+<file path=ppt/slides/slide23.xml><?xml version="1.0" encoding="utf-8"?>
 <p:sld xmlns:a="http://schemas.openxmlformats.org/drawingml/2006/main" xmlns:r="http://schemas.openxmlformats.org/officeDocument/2006/relationships" xmlns:p="http://schemas.openxmlformats.org/presentationml/2006/main">
   <p:cSld>
     <p:spTree>
@@ -22869,6 +22561,134 @@
           <a:noFill/>
         </p:spPr>
       </p:pic>
+      <p:pic>
+        <p:nvPicPr>
+          <p:cNvPr id="6" name="Picture 5" descr="Double Free on the player struct">
+            <a:extLst>
+              <a:ext uri="{FF2B5EF4-FFF2-40B4-BE49-F238E27FC236}">
+                <a16:creationId xmlns:a16="http://schemas.microsoft.com/office/drawing/2014/main" id="{72BC5C9B-AF05-4145-A9B1-462F2C8F01DC}"/>
+              </a:ext>
+            </a:extLst>
+          </p:cNvPr>
+          <p:cNvPicPr>
+            <a:picLocks noChangeAspect="1"/>
+          </p:cNvPicPr>
+          <p:nvPr/>
+        </p:nvPicPr>
+        <p:blipFill>
+          <a:blip r:embed="rId3"/>
+          <a:stretch>
+            <a:fillRect/>
+          </a:stretch>
+        </p:blipFill>
+        <p:spPr>
+          <a:xfrm>
+            <a:off x="758488" y="2892361"/>
+            <a:ext cx="3140405" cy="1977292"/>
+          </a:xfrm>
+          <a:prstGeom prst="rect">
+            <a:avLst/>
+          </a:prstGeom>
+        </p:spPr>
+      </p:pic>
+      <p:sp>
+        <p:nvSpPr>
+          <p:cNvPr id="7" name="Rectangle 6">
+            <a:extLst>
+              <a:ext uri="{FF2B5EF4-FFF2-40B4-BE49-F238E27FC236}">
+                <a16:creationId xmlns:a16="http://schemas.microsoft.com/office/drawing/2014/main" id="{4817ABD6-E4AA-6646-B26E-38650389958F}"/>
+              </a:ext>
+            </a:extLst>
+          </p:cNvPr>
+          <p:cNvSpPr/>
+          <p:nvPr/>
+        </p:nvSpPr>
+        <p:spPr>
+          <a:xfrm>
+            <a:off x="1937657" y="4044554"/>
+            <a:ext cx="783773" cy="830313"/>
+          </a:xfrm>
+          <a:prstGeom prst="rect">
+            <a:avLst/>
+          </a:prstGeom>
+          <a:solidFill>
+            <a:schemeClr val="bg1"/>
+          </a:solidFill>
+          <a:ln>
+            <a:solidFill>
+              <a:schemeClr val="bg1"/>
+            </a:solidFill>
+          </a:ln>
+        </p:spPr>
+        <p:style>
+          <a:lnRef idx="2">
+            <a:schemeClr val="accent1">
+              <a:shade val="50000"/>
+            </a:schemeClr>
+          </a:lnRef>
+          <a:fillRef idx="1">
+            <a:schemeClr val="accent1"/>
+          </a:fillRef>
+          <a:effectRef idx="0">
+            <a:schemeClr val="accent1"/>
+          </a:effectRef>
+          <a:fontRef idx="minor">
+            <a:schemeClr val="lt1"/>
+          </a:fontRef>
+        </p:style>
+        <p:txBody>
+          <a:bodyPr rtlCol="0" anchor="ctr"/>
+          <a:lstStyle/>
+          <a:p>
+            <a:pPr algn="ctr"/>
+            <a:endParaRPr lang="en-US"/>
+          </a:p>
+        </p:txBody>
+      </p:sp>
+      <p:cxnSp>
+        <p:nvCxnSpPr>
+          <p:cNvPr id="10" name="Straight Arrow Connector 9">
+            <a:extLst>
+              <a:ext uri="{FF2B5EF4-FFF2-40B4-BE49-F238E27FC236}">
+                <a16:creationId xmlns:a16="http://schemas.microsoft.com/office/drawing/2014/main" id="{95252B5A-1C11-B84E-A262-B227A2CE8E7B}"/>
+              </a:ext>
+            </a:extLst>
+          </p:cNvPr>
+          <p:cNvCxnSpPr>
+            <a:cxnSpLocks/>
+          </p:cNvCxnSpPr>
+          <p:nvPr/>
+        </p:nvCxnSpPr>
+        <p:spPr>
+          <a:xfrm flipV="1">
+            <a:off x="3884721" y="2351314"/>
+            <a:ext cx="2537851" cy="1723932"/>
+          </a:xfrm>
+          <a:prstGeom prst="straightConnector1">
+            <a:avLst/>
+          </a:prstGeom>
+          <a:ln w="101600">
+            <a:solidFill>
+              <a:srgbClr val="FF0000"/>
+            </a:solidFill>
+            <a:tailEnd type="triangle"/>
+          </a:ln>
+        </p:spPr>
+        <p:style>
+          <a:lnRef idx="1">
+            <a:schemeClr val="accent1"/>
+          </a:lnRef>
+          <a:fillRef idx="0">
+            <a:schemeClr val="accent1"/>
+          </a:fillRef>
+          <a:effectRef idx="0">
+            <a:schemeClr val="accent1"/>
+          </a:effectRef>
+          <a:fontRef idx="minor">
+            <a:schemeClr val="tx1"/>
+          </a:fontRef>
+        </p:style>
+      </p:cxnSp>
     </p:spTree>
     <p:extLst>
       <p:ext uri="{BB962C8B-B14F-4D97-AF65-F5344CB8AC3E}">
@@ -22882,7 +22702,7 @@
 </p:sld>
 </file>
 
-<file path=ppt/slides/slide26.xml><?xml version="1.0" encoding="utf-8"?>
+<file path=ppt/slides/slide24.xml><?xml version="1.0" encoding="utf-8"?>
 <p:sld xmlns:a="http://schemas.openxmlformats.org/drawingml/2006/main" xmlns:r="http://schemas.openxmlformats.org/officeDocument/2006/relationships" xmlns:p="http://schemas.openxmlformats.org/presentationml/2006/main">
   <p:cSld>
     <p:spTree>
@@ -23024,7 +22844,7 @@
 </p:sld>
 </file>
 
-<file path=ppt/slides/slide27.xml><?xml version="1.0" encoding="utf-8"?>
+<file path=ppt/slides/slide25.xml><?xml version="1.0" encoding="utf-8"?>
 <p:sld xmlns:a="http://schemas.openxmlformats.org/drawingml/2006/main" xmlns:r="http://schemas.openxmlformats.org/officeDocument/2006/relationships" xmlns:p="http://schemas.openxmlformats.org/presentationml/2006/main">
   <p:cSld>
     <p:spTree>
@@ -23165,7 +22985,7 @@
 </p:sld>
 </file>
 
-<file path=ppt/slides/slide28.xml><?xml version="1.0" encoding="utf-8"?>
+<file path=ppt/slides/slide26.xml><?xml version="1.0" encoding="utf-8"?>
 <p:sld xmlns:a="http://schemas.openxmlformats.org/drawingml/2006/main" xmlns:r="http://schemas.openxmlformats.org/officeDocument/2006/relationships" xmlns:p="http://schemas.openxmlformats.org/presentationml/2006/main">
   <p:cSld>
     <p:spTree>
@@ -23325,7 +23145,7 @@
 </p:sld>
 </file>
 
-<file path=ppt/slides/slide29.xml><?xml version="1.0" encoding="utf-8"?>
+<file path=ppt/slides/slide27.xml><?xml version="1.0" encoding="utf-8"?>
 <p:sld xmlns:a="http://schemas.openxmlformats.org/drawingml/2006/main" xmlns:r="http://schemas.openxmlformats.org/officeDocument/2006/relationships" xmlns:p="http://schemas.openxmlformats.org/presentationml/2006/main">
   <p:cSld>
     <p:spTree>
@@ -23365,7 +23185,7 @@
           <a:p>
             <a:r>
               <a:rPr lang="en-US" dirty="0"/>
-              <a:t>Double Free – Solution (again)</a:t>
+              <a:t>Double Free - Solution</a:t>
             </a:r>
           </a:p>
         </p:txBody>
@@ -23400,7 +23220,7 @@
           <a:p>
             <a:r>
               <a:rPr lang="en-US" dirty="0"/>
-              <a:t>Create User </a:t>
+              <a:t>Create User (Malloc) </a:t>
             </a:r>
             <a:r>
               <a:rPr lang="en-US" dirty="0">
@@ -23413,7 +23233,7 @@
           <a:p>
             <a:r>
               <a:rPr lang="en-US" dirty="0"/>
-              <a:t>Reset User </a:t>
+              <a:t>Reset User (Free) </a:t>
             </a:r>
             <a:r>
               <a:rPr lang="en-US" dirty="0">
@@ -23425,7 +23245,7 @@
           <a:p>
             <a:r>
               <a:rPr lang="en-US" dirty="0"/>
-              <a:t>Reset User </a:t>
+              <a:t>Reset User  (Free) </a:t>
             </a:r>
             <a:r>
               <a:rPr lang="en-US" dirty="0">
@@ -23437,7 +23257,7 @@
           <a:p>
             <a:r>
               <a:rPr lang="en-US" dirty="0"/>
-              <a:t>Create User </a:t>
+              <a:t>Create User (Malloc) </a:t>
             </a:r>
             <a:r>
               <a:rPr lang="en-US" dirty="0">
@@ -23499,7 +23319,236 @@
     </p:spTree>
     <p:extLst>
       <p:ext uri="{BB962C8B-B14F-4D97-AF65-F5344CB8AC3E}">
-        <p14:creationId xmlns:p14="http://schemas.microsoft.com/office/powerpoint/2010/main" val="3921223547"/>
+        <p14:creationId xmlns:p14="http://schemas.microsoft.com/office/powerpoint/2010/main" val="4134476742"/>
+      </p:ext>
+    </p:extLst>
+  </p:cSld>
+  <p:clrMapOvr>
+    <a:masterClrMapping/>
+  </p:clrMapOvr>
+</p:sld>
+</file>
+
+<file path=ppt/slides/slide28.xml><?xml version="1.0" encoding="utf-8"?>
+<p:sld xmlns:a="http://schemas.openxmlformats.org/drawingml/2006/main" xmlns:r="http://schemas.openxmlformats.org/officeDocument/2006/relationships" xmlns:p="http://schemas.openxmlformats.org/presentationml/2006/main">
+  <p:cSld>
+    <p:spTree>
+      <p:nvGrpSpPr>
+        <p:cNvPr id="1" name=""/>
+        <p:cNvGrpSpPr/>
+        <p:nvPr/>
+      </p:nvGrpSpPr>
+      <p:grpSpPr>
+        <a:xfrm>
+          <a:off x="0" y="0"/>
+          <a:ext cx="0" cy="0"/>
+          <a:chOff x="0" y="0"/>
+          <a:chExt cx="0" cy="0"/>
+        </a:xfrm>
+      </p:grpSpPr>
+      <p:sp>
+        <p:nvSpPr>
+          <p:cNvPr id="2" name="Title 1">
+            <a:extLst>
+              <a:ext uri="{FF2B5EF4-FFF2-40B4-BE49-F238E27FC236}">
+                <a16:creationId xmlns:a16="http://schemas.microsoft.com/office/drawing/2014/main" id="{DEA2737F-EFA2-CC46-BEF5-D2B3628E914F}"/>
+              </a:ext>
+            </a:extLst>
+          </p:cNvPr>
+          <p:cNvSpPr>
+            <a:spLocks noGrp="1"/>
+          </p:cNvSpPr>
+          <p:nvPr>
+            <p:ph type="title"/>
+          </p:nvPr>
+        </p:nvSpPr>
+        <p:spPr>
+          <a:xfrm>
+            <a:off x="628650" y="273847"/>
+            <a:ext cx="7886700" cy="994172"/>
+          </a:xfrm>
+        </p:spPr>
+        <p:txBody>
+          <a:bodyPr anchor="ctr">
+            <a:normAutofit/>
+          </a:bodyPr>
+          <a:lstStyle/>
+          <a:p>
+            <a:r>
+              <a:rPr lang="en-US" dirty="0"/>
+              <a:t>Double Free - Troubles</a:t>
+            </a:r>
+          </a:p>
+        </p:txBody>
+      </p:sp>
+      <p:graphicFrame>
+        <p:nvGraphicFramePr>
+          <p:cNvPr id="5" name="Content Placeholder 2">
+            <a:extLst>
+              <a:ext uri="{FF2B5EF4-FFF2-40B4-BE49-F238E27FC236}">
+                <a16:creationId xmlns:a16="http://schemas.microsoft.com/office/drawing/2014/main" id="{CC175BC7-D35C-423C-A548-44FBBA1CC9BC}"/>
+              </a:ext>
+            </a:extLst>
+          </p:cNvPr>
+          <p:cNvGraphicFramePr>
+            <a:graphicFrameLocks noGrp="1"/>
+          </p:cNvGraphicFramePr>
+          <p:nvPr>
+            <p:ph idx="1"/>
+            <p:extLst>
+              <p:ext uri="{D42A27DB-BD31-4B8C-83A1-F6EECF244321}">
+                <p14:modId xmlns:p14="http://schemas.microsoft.com/office/powerpoint/2010/main" val="3586994139"/>
+              </p:ext>
+            </p:extLst>
+          </p:nvPr>
+        </p:nvGraphicFramePr>
+        <p:xfrm>
+          <a:off x="628650" y="1236541"/>
+          <a:ext cx="7886700" cy="3263504"/>
+        </p:xfrm>
+        <a:graphic>
+          <a:graphicData uri="http://schemas.openxmlformats.org/drawingml/2006/diagram">
+            <dgm:relIds xmlns:dgm="http://schemas.openxmlformats.org/drawingml/2006/diagram" xmlns:r="http://schemas.openxmlformats.org/officeDocument/2006/relationships" r:dm="rId2" r:lo="rId3" r:qs="rId4" r:cs="rId5"/>
+          </a:graphicData>
+        </a:graphic>
+      </p:graphicFrame>
+    </p:spTree>
+    <p:extLst>
+      <p:ext uri="{BB962C8B-B14F-4D97-AF65-F5344CB8AC3E}">
+        <p14:creationId xmlns:p14="http://schemas.microsoft.com/office/powerpoint/2010/main" val="206295773"/>
+      </p:ext>
+    </p:extLst>
+  </p:cSld>
+  <p:clrMapOvr>
+    <a:masterClrMapping/>
+  </p:clrMapOvr>
+</p:sld>
+</file>
+
+<file path=ppt/slides/slide29.xml><?xml version="1.0" encoding="utf-8"?>
+<p:sld xmlns:a="http://schemas.openxmlformats.org/drawingml/2006/main" xmlns:r="http://schemas.openxmlformats.org/officeDocument/2006/relationships" xmlns:p="http://schemas.openxmlformats.org/presentationml/2006/main">
+  <p:cSld>
+    <p:spTree>
+      <p:nvGrpSpPr>
+        <p:cNvPr id="1" name=""/>
+        <p:cNvGrpSpPr/>
+        <p:nvPr/>
+      </p:nvGrpSpPr>
+      <p:grpSpPr>
+        <a:xfrm>
+          <a:off x="0" y="0"/>
+          <a:ext cx="0" cy="0"/>
+          <a:chOff x="0" y="0"/>
+          <a:chExt cx="0" cy="0"/>
+        </a:xfrm>
+      </p:grpSpPr>
+      <p:sp>
+        <p:nvSpPr>
+          <p:cNvPr id="2" name="Title 1">
+            <a:extLst>
+              <a:ext uri="{FF2B5EF4-FFF2-40B4-BE49-F238E27FC236}">
+                <a16:creationId xmlns:a16="http://schemas.microsoft.com/office/drawing/2014/main" id="{E47848F9-6440-9946-908B-989B1F1A5D65}"/>
+              </a:ext>
+            </a:extLst>
+          </p:cNvPr>
+          <p:cNvSpPr>
+            <a:spLocks noGrp="1"/>
+          </p:cNvSpPr>
+          <p:nvPr>
+            <p:ph type="title"/>
+          </p:nvPr>
+        </p:nvSpPr>
+        <p:spPr/>
+        <p:txBody>
+          <a:bodyPr/>
+          <a:lstStyle/>
+          <a:p>
+            <a:r>
+              <a:rPr lang="en-US" dirty="0"/>
+              <a:t>Double Free – </a:t>
+            </a:r>
+            <a:r>
+              <a:rPr lang="en-US" dirty="0" err="1"/>
+              <a:t>Atttack</a:t>
+            </a:r>
+            <a:r>
+              <a:rPr lang="en-US" dirty="0"/>
+              <a:t> #2+</a:t>
+            </a:r>
+          </a:p>
+        </p:txBody>
+      </p:sp>
+      <p:sp>
+        <p:nvSpPr>
+          <p:cNvPr id="3" name="Content Placeholder 2">
+            <a:extLst>
+              <a:ext uri="{FF2B5EF4-FFF2-40B4-BE49-F238E27FC236}">
+                <a16:creationId xmlns:a16="http://schemas.microsoft.com/office/drawing/2014/main" id="{224D8E59-DE3E-C842-9A66-6B92382B0D8C}"/>
+              </a:ext>
+            </a:extLst>
+          </p:cNvPr>
+          <p:cNvSpPr>
+            <a:spLocks noGrp="1"/>
+          </p:cNvSpPr>
+          <p:nvPr>
+            <p:ph idx="1"/>
+          </p:nvPr>
+        </p:nvSpPr>
+        <p:spPr/>
+        <p:txBody>
+          <a:bodyPr/>
+          <a:lstStyle/>
+          <a:p>
+            <a:r>
+              <a:rPr lang="en-US" dirty="0"/>
+              <a:t>House of </a:t>
+            </a:r>
+            <a:r>
+              <a:rPr lang="en-US" dirty="0" err="1"/>
+              <a:t>Botcake</a:t>
+            </a:r>
+            <a:r>
+              <a:rPr lang="en-US" dirty="0"/>
+              <a:t> (TCache with unsorted bin)</a:t>
+            </a:r>
+          </a:p>
+          <a:p>
+            <a:r>
+              <a:rPr lang="en-US" dirty="0" err="1"/>
+              <a:t>Fastbin</a:t>
+            </a:r>
+            <a:r>
+              <a:rPr lang="en-US" dirty="0"/>
+              <a:t> </a:t>
+            </a:r>
+            <a:r>
+              <a:rPr lang="en-US" dirty="0" err="1"/>
+              <a:t>Dupping</a:t>
+            </a:r>
+            <a:endParaRPr lang="en-US" dirty="0"/>
+          </a:p>
+          <a:p>
+            <a:r>
+              <a:rPr lang="en-US" dirty="0" err="1"/>
+              <a:t>Fastbin</a:t>
+            </a:r>
+            <a:r>
+              <a:rPr lang="en-US" dirty="0"/>
+              <a:t> Dup from consolidation</a:t>
+            </a:r>
+          </a:p>
+          <a:p>
+            <a:r>
+              <a:rPr lang="en-US" dirty="0"/>
+              <a:t>….</a:t>
+            </a:r>
+          </a:p>
+        </p:txBody>
+      </p:sp>
+    </p:spTree>
+    <p:extLst>
+      <p:ext uri="{BB962C8B-B14F-4D97-AF65-F5344CB8AC3E}">
+        <p14:creationId xmlns:p14="http://schemas.microsoft.com/office/powerpoint/2010/main" val="3363903550"/>
       </p:ext>
     </p:extLst>
   </p:cSld>
@@ -23606,235 +23655,6 @@
 </file>
 
 <file path=ppt/slides/slide30.xml><?xml version="1.0" encoding="utf-8"?>
-<p:sld xmlns:a="http://schemas.openxmlformats.org/drawingml/2006/main" xmlns:r="http://schemas.openxmlformats.org/officeDocument/2006/relationships" xmlns:p="http://schemas.openxmlformats.org/presentationml/2006/main">
-  <p:cSld>
-    <p:spTree>
-      <p:nvGrpSpPr>
-        <p:cNvPr id="1" name=""/>
-        <p:cNvGrpSpPr/>
-        <p:nvPr/>
-      </p:nvGrpSpPr>
-      <p:grpSpPr>
-        <a:xfrm>
-          <a:off x="0" y="0"/>
-          <a:ext cx="0" cy="0"/>
-          <a:chOff x="0" y="0"/>
-          <a:chExt cx="0" cy="0"/>
-        </a:xfrm>
-      </p:grpSpPr>
-      <p:sp>
-        <p:nvSpPr>
-          <p:cNvPr id="2" name="Title 1">
-            <a:extLst>
-              <a:ext uri="{FF2B5EF4-FFF2-40B4-BE49-F238E27FC236}">
-                <a16:creationId xmlns:a16="http://schemas.microsoft.com/office/drawing/2014/main" id="{DEA2737F-EFA2-CC46-BEF5-D2B3628E914F}"/>
-              </a:ext>
-            </a:extLst>
-          </p:cNvPr>
-          <p:cNvSpPr>
-            <a:spLocks noGrp="1"/>
-          </p:cNvSpPr>
-          <p:nvPr>
-            <p:ph type="title"/>
-          </p:nvPr>
-        </p:nvSpPr>
-        <p:spPr>
-          <a:xfrm>
-            <a:off x="628650" y="273847"/>
-            <a:ext cx="7886700" cy="994172"/>
-          </a:xfrm>
-        </p:spPr>
-        <p:txBody>
-          <a:bodyPr anchor="ctr">
-            <a:normAutofit/>
-          </a:bodyPr>
-          <a:lstStyle/>
-          <a:p>
-            <a:r>
-              <a:rPr lang="en-US" dirty="0"/>
-              <a:t>Double Free - Troubles</a:t>
-            </a:r>
-          </a:p>
-        </p:txBody>
-      </p:sp>
-      <p:graphicFrame>
-        <p:nvGraphicFramePr>
-          <p:cNvPr id="5" name="Content Placeholder 2">
-            <a:extLst>
-              <a:ext uri="{FF2B5EF4-FFF2-40B4-BE49-F238E27FC236}">
-                <a16:creationId xmlns:a16="http://schemas.microsoft.com/office/drawing/2014/main" id="{CC175BC7-D35C-423C-A548-44FBBA1CC9BC}"/>
-              </a:ext>
-            </a:extLst>
-          </p:cNvPr>
-          <p:cNvGraphicFramePr>
-            <a:graphicFrameLocks noGrp="1"/>
-          </p:cNvGraphicFramePr>
-          <p:nvPr>
-            <p:ph idx="1"/>
-            <p:extLst>
-              <p:ext uri="{D42A27DB-BD31-4B8C-83A1-F6EECF244321}">
-                <p14:modId xmlns:p14="http://schemas.microsoft.com/office/powerpoint/2010/main" val="3586994139"/>
-              </p:ext>
-            </p:extLst>
-          </p:nvPr>
-        </p:nvGraphicFramePr>
-        <p:xfrm>
-          <a:off x="628650" y="1236541"/>
-          <a:ext cx="7886700" cy="3263504"/>
-        </p:xfrm>
-        <a:graphic>
-          <a:graphicData uri="http://schemas.openxmlformats.org/drawingml/2006/diagram">
-            <dgm:relIds xmlns:dgm="http://schemas.openxmlformats.org/drawingml/2006/diagram" xmlns:r="http://schemas.openxmlformats.org/officeDocument/2006/relationships" r:dm="rId2" r:lo="rId3" r:qs="rId4" r:cs="rId5"/>
-          </a:graphicData>
-        </a:graphic>
-      </p:graphicFrame>
-    </p:spTree>
-    <p:extLst>
-      <p:ext uri="{BB962C8B-B14F-4D97-AF65-F5344CB8AC3E}">
-        <p14:creationId xmlns:p14="http://schemas.microsoft.com/office/powerpoint/2010/main" val="206295773"/>
-      </p:ext>
-    </p:extLst>
-  </p:cSld>
-  <p:clrMapOvr>
-    <a:masterClrMapping/>
-  </p:clrMapOvr>
-</p:sld>
-</file>
-
-<file path=ppt/slides/slide31.xml><?xml version="1.0" encoding="utf-8"?>
-<p:sld xmlns:a="http://schemas.openxmlformats.org/drawingml/2006/main" xmlns:r="http://schemas.openxmlformats.org/officeDocument/2006/relationships" xmlns:p="http://schemas.openxmlformats.org/presentationml/2006/main">
-  <p:cSld>
-    <p:spTree>
-      <p:nvGrpSpPr>
-        <p:cNvPr id="1" name=""/>
-        <p:cNvGrpSpPr/>
-        <p:nvPr/>
-      </p:nvGrpSpPr>
-      <p:grpSpPr>
-        <a:xfrm>
-          <a:off x="0" y="0"/>
-          <a:ext cx="0" cy="0"/>
-          <a:chOff x="0" y="0"/>
-          <a:chExt cx="0" cy="0"/>
-        </a:xfrm>
-      </p:grpSpPr>
-      <p:sp>
-        <p:nvSpPr>
-          <p:cNvPr id="2" name="Title 1">
-            <a:extLst>
-              <a:ext uri="{FF2B5EF4-FFF2-40B4-BE49-F238E27FC236}">
-                <a16:creationId xmlns:a16="http://schemas.microsoft.com/office/drawing/2014/main" id="{E47848F9-6440-9946-908B-989B1F1A5D65}"/>
-              </a:ext>
-            </a:extLst>
-          </p:cNvPr>
-          <p:cNvSpPr>
-            <a:spLocks noGrp="1"/>
-          </p:cNvSpPr>
-          <p:nvPr>
-            <p:ph type="title"/>
-          </p:nvPr>
-        </p:nvSpPr>
-        <p:spPr/>
-        <p:txBody>
-          <a:bodyPr/>
-          <a:lstStyle/>
-          <a:p>
-            <a:r>
-              <a:rPr lang="en-US" dirty="0"/>
-              <a:t>Double Free – </a:t>
-            </a:r>
-            <a:r>
-              <a:rPr lang="en-US" dirty="0" err="1"/>
-              <a:t>Atttack</a:t>
-            </a:r>
-            <a:r>
-              <a:rPr lang="en-US" dirty="0"/>
-              <a:t> #2+</a:t>
-            </a:r>
-          </a:p>
-        </p:txBody>
-      </p:sp>
-      <p:sp>
-        <p:nvSpPr>
-          <p:cNvPr id="3" name="Content Placeholder 2">
-            <a:extLst>
-              <a:ext uri="{FF2B5EF4-FFF2-40B4-BE49-F238E27FC236}">
-                <a16:creationId xmlns:a16="http://schemas.microsoft.com/office/drawing/2014/main" id="{224D8E59-DE3E-C842-9A66-6B92382B0D8C}"/>
-              </a:ext>
-            </a:extLst>
-          </p:cNvPr>
-          <p:cNvSpPr>
-            <a:spLocks noGrp="1"/>
-          </p:cNvSpPr>
-          <p:nvPr>
-            <p:ph idx="1"/>
-          </p:nvPr>
-        </p:nvSpPr>
-        <p:spPr/>
-        <p:txBody>
-          <a:bodyPr/>
-          <a:lstStyle/>
-          <a:p>
-            <a:r>
-              <a:rPr lang="en-US" dirty="0"/>
-              <a:t>House of </a:t>
-            </a:r>
-            <a:r>
-              <a:rPr lang="en-US" dirty="0" err="1"/>
-              <a:t>Botcake</a:t>
-            </a:r>
-            <a:r>
-              <a:rPr lang="en-US" dirty="0"/>
-              <a:t> (TCache with unsorted bin)</a:t>
-            </a:r>
-          </a:p>
-          <a:p>
-            <a:r>
-              <a:rPr lang="en-US" dirty="0" err="1"/>
-              <a:t>Fastbin</a:t>
-            </a:r>
-            <a:r>
-              <a:rPr lang="en-US" dirty="0"/>
-              <a:t> </a:t>
-            </a:r>
-            <a:r>
-              <a:rPr lang="en-US" dirty="0" err="1"/>
-              <a:t>Dupping</a:t>
-            </a:r>
-            <a:endParaRPr lang="en-US" dirty="0"/>
-          </a:p>
-          <a:p>
-            <a:r>
-              <a:rPr lang="en-US" dirty="0" err="1"/>
-              <a:t>Fastbin</a:t>
-            </a:r>
-            <a:r>
-              <a:rPr lang="en-US" dirty="0"/>
-              <a:t> Dup from consolidation</a:t>
-            </a:r>
-          </a:p>
-          <a:p>
-            <a:r>
-              <a:rPr lang="en-US" dirty="0"/>
-              <a:t>….</a:t>
-            </a:r>
-          </a:p>
-        </p:txBody>
-      </p:sp>
-    </p:spTree>
-    <p:extLst>
-      <p:ext uri="{BB962C8B-B14F-4D97-AF65-F5344CB8AC3E}">
-        <p14:creationId xmlns:p14="http://schemas.microsoft.com/office/powerpoint/2010/main" val="3363903550"/>
-      </p:ext>
-    </p:extLst>
-  </p:cSld>
-  <p:clrMapOvr>
-    <a:masterClrMapping/>
-  </p:clrMapOvr>
-</p:sld>
-</file>
-
-<file path=ppt/slides/slide32.xml><?xml version="1.0" encoding="utf-8"?>
 <p:sld xmlns:a="http://schemas.openxmlformats.org/drawingml/2006/main" xmlns:r="http://schemas.openxmlformats.org/officeDocument/2006/relationships" xmlns:p="http://schemas.openxmlformats.org/presentationml/2006/main">
   <p:cSld>
     <p:spTree>
@@ -24035,7 +23855,7 @@
 </p:sld>
 </file>
 
-<file path=ppt/slides/slide33.xml><?xml version="1.0" encoding="utf-8"?>
+<file path=ppt/slides/slide31.xml><?xml version="1.0" encoding="utf-8"?>
 <p:sld xmlns:a="http://schemas.openxmlformats.org/drawingml/2006/main" xmlns:r="http://schemas.openxmlformats.org/officeDocument/2006/relationships" xmlns:p="http://schemas.openxmlformats.org/presentationml/2006/main">
   <p:cSld>
     <p:spTree>
@@ -24150,7 +23970,7 @@
             <a:pPr lvl="1"/>
             <a:r>
               <a:rPr lang="en-US" dirty="0"/>
-              <a:t>Free Unsorted bin chunk again</a:t>
+              <a:t>Free Unsorted bin chunk again and consolidate with another chunk</a:t>
             </a:r>
           </a:p>
           <a:p>
@@ -24172,7 +23992,7 @@
 </p:sld>
 </file>
 
-<file path=ppt/slides/slide34.xml><?xml version="1.0" encoding="utf-8"?>
+<file path=ppt/slides/slide32.xml><?xml version="1.0" encoding="utf-8"?>
 <p:sld xmlns:a="http://schemas.openxmlformats.org/drawingml/2006/main" xmlns:r="http://schemas.openxmlformats.org/officeDocument/2006/relationships" xmlns:p="http://schemas.openxmlformats.org/presentationml/2006/main">
   <p:cSld>
     <p:spTree>
@@ -24298,7 +24118,7 @@
 </p:sld>
 </file>
 
-<file path=ppt/slides/slide35.xml><?xml version="1.0" encoding="utf-8"?>
+<file path=ppt/slides/slide33.xml><?xml version="1.0" encoding="utf-8"?>
 <p:sld xmlns:a="http://schemas.openxmlformats.org/drawingml/2006/main" xmlns:r="http://schemas.openxmlformats.org/officeDocument/2006/relationships" xmlns:p="http://schemas.openxmlformats.org/presentationml/2006/main">
   <p:cSld>
     <p:spTree>
@@ -24394,7 +24214,7 @@
 </p:sld>
 </file>
 
-<file path=ppt/slides/slide36.xml><?xml version="1.0" encoding="utf-8"?>
+<file path=ppt/slides/slide34.xml><?xml version="1.0" encoding="utf-8"?>
 <p:sld xmlns:a="http://schemas.openxmlformats.org/drawingml/2006/main" xmlns:r="http://schemas.openxmlformats.org/officeDocument/2006/relationships" xmlns:p="http://schemas.openxmlformats.org/presentationml/2006/main">
   <p:cSld>
     <p:spTree>
@@ -24462,7 +24282,7 @@
             <p:ph idx="1"/>
             <p:extLst>
               <p:ext uri="{D42A27DB-BD31-4B8C-83A1-F6EECF244321}">
-                <p14:modId xmlns:p14="http://schemas.microsoft.com/office/powerpoint/2010/main" val="542344948"/>
+                <p14:modId xmlns:p14="http://schemas.microsoft.com/office/powerpoint/2010/main" val="2829146450"/>
               </p:ext>
             </p:extLst>
           </p:nvPr>
@@ -24490,7 +24310,7 @@
 </p:sld>
 </file>
 
-<file path=ppt/slides/slide37.xml><?xml version="1.0" encoding="utf-8"?>
+<file path=ppt/slides/slide35.xml><?xml version="1.0" encoding="utf-8"?>
 <p:sld xmlns:a="http://schemas.openxmlformats.org/drawingml/2006/main" xmlns:r="http://schemas.openxmlformats.org/officeDocument/2006/relationships" xmlns:p="http://schemas.openxmlformats.org/presentationml/2006/main">
   <p:cSld>
     <p:spTree>
@@ -25104,7 +24924,7 @@
         <p:spPr/>
         <p:txBody>
           <a:bodyPr>
-            <a:normAutofit lnSpcReduction="10000"/>
+            <a:normAutofit fontScale="92500" lnSpcReduction="20000"/>
           </a:bodyPr>
           <a:lstStyle/>
           <a:p>
@@ -25176,6 +24996,29 @@
             <a:r>
               <a:rPr lang="en-US" dirty="0"/>
               <a:t>: Check to see if you have the high score</a:t>
+            </a:r>
+          </a:p>
+          <a:p>
+            <a:pPr lvl="1"/>
+            <a:r>
+              <a:rPr lang="en-US" dirty="0"/>
+              <a:t>set: The </a:t>
+            </a:r>
+            <a:r>
+              <a:rPr lang="en-US" i="1" dirty="0"/>
+              <a:t>new</a:t>
+            </a:r>
+            <a:r>
+              <a:rPr lang="en-US" dirty="0"/>
+              <a:t> high score to be set (don’t need this for </a:t>
+            </a:r>
+            <a:r>
+              <a:rPr lang="en-US" dirty="0" err="1"/>
+              <a:t>pwn</a:t>
+            </a:r>
+            <a:r>
+              <a:rPr lang="en-US" dirty="0"/>
+              <a:t>!)</a:t>
             </a:r>
           </a:p>
           <a:p>
@@ -25251,7 +25094,7 @@
           <p:cNvPr id="2" name="Title 1">
             <a:extLst>
               <a:ext uri="{FF2B5EF4-FFF2-40B4-BE49-F238E27FC236}">
-                <a16:creationId xmlns:a16="http://schemas.microsoft.com/office/drawing/2014/main" id="{142B44C5-7D46-424A-BA3F-8EC5059074A8}"/>
+                <a16:creationId xmlns:a16="http://schemas.microsoft.com/office/drawing/2014/main" id="{08506B2A-1853-DC4C-8F91-DA7FFFFD7CD8}"/>
               </a:ext>
             </a:extLst>
           </p:cNvPr>
@@ -25262,14 +25105,21 @@
             <p:ph type="title"/>
           </p:nvPr>
         </p:nvSpPr>
-        <p:spPr/>
+        <p:spPr>
+          <a:xfrm>
+            <a:off x="628650" y="273847"/>
+            <a:ext cx="7886700" cy="994172"/>
+          </a:xfrm>
+        </p:spPr>
         <p:txBody>
-          <a:bodyPr/>
+          <a:bodyPr anchor="ctr">
+            <a:normAutofit/>
+          </a:bodyPr>
           <a:lstStyle/>
           <a:p>
             <a:r>
               <a:rPr lang="en-US" dirty="0"/>
-              <a:t>UAF - Solution</a:t>
+              <a:t>UAF – Solution Diagram 1</a:t>
             </a:r>
           </a:p>
         </p:txBody>
@@ -25279,7 +25129,7 @@
           <p:cNvPr id="3" name="Content Placeholder 2">
             <a:extLst>
               <a:ext uri="{FF2B5EF4-FFF2-40B4-BE49-F238E27FC236}">
-                <a16:creationId xmlns:a16="http://schemas.microsoft.com/office/drawing/2014/main" id="{122781D7-B5DC-7342-A22F-35FBC8C8DC13}"/>
+                <a16:creationId xmlns:a16="http://schemas.microsoft.com/office/drawing/2014/main" id="{7F271F73-3DDC-104B-BA9C-1D75C1191326}"/>
               </a:ext>
             </a:extLst>
           </p:cNvPr>
@@ -25287,92 +25137,63 @@
             <a:spLocks noGrp="1"/>
           </p:cNvSpPr>
           <p:nvPr>
-            <p:ph idx="1"/>
+            <p:ph sz="half" idx="1"/>
           </p:nvPr>
         </p:nvSpPr>
-        <p:spPr/>
+        <p:spPr>
+          <a:xfrm>
+            <a:off x="628650" y="1369219"/>
+            <a:ext cx="3886200" cy="3263504"/>
+          </a:xfrm>
+        </p:spPr>
         <p:txBody>
-          <a:bodyPr/>
+          <a:bodyPr>
+            <a:normAutofit/>
+          </a:bodyPr>
           <a:lstStyle/>
           <a:p>
             <a:r>
               <a:rPr lang="en-US" dirty="0"/>
-              <a:t>Create User </a:t>
-            </a:r>
-            <a:r>
-              <a:rPr lang="en-US" dirty="0">
-                <a:sym typeface="Wingdings" pitchFamily="2" charset="2"/>
-              </a:rPr>
-              <a:t> Allocates a malloc chunk</a:t>
-            </a:r>
-            <a:endParaRPr lang="en-US" dirty="0"/>
-          </a:p>
-          <a:p>
-            <a:r>
-              <a:rPr lang="en-US" dirty="0"/>
-              <a:t>Reset User </a:t>
-            </a:r>
-            <a:r>
-              <a:rPr lang="en-US" dirty="0">
-                <a:sym typeface="Wingdings" pitchFamily="2" charset="2"/>
-              </a:rPr>
-              <a:t> Frees a malloc chunk</a:t>
-            </a:r>
-            <a:endParaRPr lang="en-US" dirty="0"/>
-          </a:p>
-          <a:p>
-            <a:r>
-              <a:rPr lang="en-US" dirty="0"/>
-              <a:t>Play </a:t>
-            </a:r>
-            <a:r>
-              <a:rPr lang="en-US" dirty="0">
-                <a:sym typeface="Wingdings" pitchFamily="2" charset="2"/>
-              </a:rPr>
-              <a:t> Allocates a malloc chunk (reuses previous chunk) </a:t>
-            </a:r>
-          </a:p>
-          <a:p>
-            <a:r>
-              <a:rPr lang="en-US" dirty="0"/>
-              <a:t>Win </a:t>
-            </a:r>
-            <a:r>
-              <a:rPr lang="en-US" dirty="0">
-                <a:sym typeface="Wingdings" pitchFamily="2" charset="2"/>
-              </a:rPr>
-              <a:t> Score is at </a:t>
-            </a:r>
-            <a:r>
-              <a:rPr lang="en-US" b="1" i="1" dirty="0">
-                <a:sym typeface="Wingdings" pitchFamily="2" charset="2"/>
-              </a:rPr>
-              <a:t>103</a:t>
-            </a:r>
-            <a:r>
-              <a:rPr lang="en-US" b="1" dirty="0">
-                <a:sym typeface="Wingdings" pitchFamily="2" charset="2"/>
-              </a:rPr>
-              <a:t> </a:t>
-            </a:r>
-            <a:r>
-              <a:rPr lang="en-US" dirty="0">
-                <a:sym typeface="Wingdings" pitchFamily="2" charset="2"/>
-              </a:rPr>
-              <a:t>from the ‘play’ calculations</a:t>
-            </a:r>
-            <a:endParaRPr lang="en-US" dirty="0"/>
-          </a:p>
-          <a:p>
-            <a:pPr lvl="1"/>
-            <a:endParaRPr lang="en-US" dirty="0"/>
+              <a:t>Allocate a player</a:t>
+            </a:r>
           </a:p>
         </p:txBody>
       </p:sp>
+      <p:pic>
+        <p:nvPicPr>
+          <p:cNvPr id="5" name="Picture 4" descr="Diagram&#10;&#10;Description automatically generated">
+            <a:extLst>
+              <a:ext uri="{FF2B5EF4-FFF2-40B4-BE49-F238E27FC236}">
+                <a16:creationId xmlns:a16="http://schemas.microsoft.com/office/drawing/2014/main" id="{74FCBF0C-D21E-6A4B-BAFE-2A17B6B17FE6}"/>
+              </a:ext>
+            </a:extLst>
+          </p:cNvPr>
+          <p:cNvPicPr>
+            <a:picLocks noChangeAspect="1"/>
+          </p:cNvPicPr>
+          <p:nvPr/>
+        </p:nvPicPr>
+        <p:blipFill>
+          <a:blip r:embed="rId2"/>
+          <a:stretch>
+            <a:fillRect/>
+          </a:stretch>
+        </p:blipFill>
+        <p:spPr>
+          <a:xfrm>
+            <a:off x="4629150" y="1438395"/>
+            <a:ext cx="3886200" cy="3125152"/>
+          </a:xfrm>
+          <a:prstGeom prst="rect">
+            <a:avLst/>
+          </a:prstGeom>
+          <a:noFill/>
+        </p:spPr>
+      </p:pic>
     </p:spTree>
     <p:extLst>
       <p:ext uri="{BB962C8B-B14F-4D97-AF65-F5344CB8AC3E}">
-        <p14:creationId xmlns:p14="http://schemas.microsoft.com/office/powerpoint/2010/main" val="3864343798"/>
+        <p14:creationId xmlns:p14="http://schemas.microsoft.com/office/powerpoint/2010/main" val="1653033134"/>
       </p:ext>
     </p:extLst>
   </p:cSld>
@@ -25429,7 +25250,7 @@
           <a:p>
             <a:r>
               <a:rPr lang="en-US" dirty="0"/>
-              <a:t>UAF – Solution Diagram 1</a:t>
+              <a:t>UAF – Solution Diagram 2</a:t>
             </a:r>
           </a:p>
         </p:txBody>
@@ -25464,17 +25285,50 @@
           <a:p>
             <a:r>
               <a:rPr lang="en-US" dirty="0"/>
-              <a:t>Allocate a player</a:t>
+              <a:t>Free (reset) a player</a:t>
+            </a:r>
+          </a:p>
+          <a:p>
+            <a:r>
+              <a:rPr lang="en-US" dirty="0"/>
+              <a:t>Puts a </a:t>
+            </a:r>
+            <a:r>
+              <a:rPr lang="en-US" i="1" dirty="0"/>
+              <a:t>chunk</a:t>
+            </a:r>
+            <a:r>
+              <a:rPr lang="en-US" dirty="0"/>
+              <a:t> into the </a:t>
+            </a:r>
+            <a:r>
+              <a:rPr lang="en-US" dirty="0" err="1"/>
+              <a:t>tcache</a:t>
+            </a:r>
+            <a:endParaRPr lang="en-US" dirty="0"/>
+          </a:p>
+          <a:p>
+            <a:r>
+              <a:rPr lang="en-US" dirty="0"/>
+              <a:t>Creates a UAF on the </a:t>
+            </a:r>
+            <a:r>
+              <a:rPr lang="en-US" i="1" dirty="0"/>
+              <a:t>player </a:t>
+            </a:r>
+            <a:r>
+              <a:rPr lang="en-US" dirty="0"/>
+              <a:t>struct</a:t>
             </a:r>
           </a:p>
         </p:txBody>
       </p:sp>
       <p:pic>
         <p:nvPicPr>
-          <p:cNvPr id="5" name="Picture 4" descr="Diagram&#10;&#10;Description automatically generated">
+          <p:cNvPr id="8" name="Picture 7" descr="Free the player struct">
             <a:extLst>
               <a:ext uri="{FF2B5EF4-FFF2-40B4-BE49-F238E27FC236}">
-                <a16:creationId xmlns:a16="http://schemas.microsoft.com/office/drawing/2014/main" id="{74FCBF0C-D21E-6A4B-BAFE-2A17B6B17FE6}"/>
+                <a16:creationId xmlns:a16="http://schemas.microsoft.com/office/drawing/2014/main" id="{545C6C7E-195D-2B41-A6B9-D3470285E14F}"/>
               </a:ext>
             </a:extLst>
           </p:cNvPr>
@@ -25491,19 +25345,18 @@
         </p:blipFill>
         <p:spPr>
           <a:xfrm>
-            <a:off x="4629150" y="1438395"/>
-            <a:ext cx="3886200" cy="3125152"/>
+            <a:off x="4413314" y="1369218"/>
+            <a:ext cx="3886199" cy="3108959"/>
           </a:xfrm>
           <a:prstGeom prst="rect">
             <a:avLst/>
           </a:prstGeom>
-          <a:noFill/>
         </p:spPr>
       </p:pic>
     </p:spTree>
     <p:extLst>
       <p:ext uri="{BB962C8B-B14F-4D97-AF65-F5344CB8AC3E}">
-        <p14:creationId xmlns:p14="http://schemas.microsoft.com/office/powerpoint/2010/main" val="1653033134"/>
+        <p14:creationId xmlns:p14="http://schemas.microsoft.com/office/powerpoint/2010/main" val="3826566874"/>
       </p:ext>
     </p:extLst>
   </p:cSld>
@@ -25560,7 +25413,7 @@
           <a:p>
             <a:r>
               <a:rPr lang="en-US" dirty="0"/>
-              <a:t>UAF – Solution Diagram 2</a:t>
+              <a:t>UAF – Solution Diagram 3</a:t>
             </a:r>
           </a:p>
         </p:txBody>
@@ -25595,50 +25448,23 @@
           <a:p>
             <a:r>
               <a:rPr lang="en-US" dirty="0"/>
-              <a:t>Free (reset) a player</a:t>
+              <a:t>Play</a:t>
             </a:r>
           </a:p>
           <a:p>
             <a:r>
               <a:rPr lang="en-US" dirty="0"/>
-              <a:t>Puts a </a:t>
-            </a:r>
-            <a:r>
-              <a:rPr lang="en-US" i="1" dirty="0"/>
-              <a:t>chunk</a:t>
-            </a:r>
-            <a:r>
-              <a:rPr lang="en-US" dirty="0"/>
-              <a:t> into the </a:t>
-            </a:r>
-            <a:r>
-              <a:rPr lang="en-US" dirty="0" err="1"/>
-              <a:t>fastbin</a:t>
-            </a:r>
-            <a:endParaRPr lang="en-US" dirty="0"/>
-          </a:p>
-          <a:p>
-            <a:r>
-              <a:rPr lang="en-US" dirty="0"/>
-              <a:t>Creates a UAF on the </a:t>
-            </a:r>
-            <a:r>
-              <a:rPr lang="en-US" i="1" dirty="0"/>
-              <a:t>player </a:t>
-            </a:r>
-            <a:r>
-              <a:rPr lang="en-US" dirty="0"/>
-              <a:t>struct</a:t>
+              <a:t>Allocates a chunk of size 0x20</a:t>
             </a:r>
           </a:p>
         </p:txBody>
       </p:sp>
       <p:pic>
         <p:nvPicPr>
-          <p:cNvPr id="8" name="Picture 7" descr="Free the player struct">
+          <p:cNvPr id="5" name="Picture 4" descr="Allocate the 'parray'">
             <a:extLst>
               <a:ext uri="{FF2B5EF4-FFF2-40B4-BE49-F238E27FC236}">
-                <a16:creationId xmlns:a16="http://schemas.microsoft.com/office/drawing/2014/main" id="{545C6C7E-195D-2B41-A6B9-D3470285E14F}"/>
+                <a16:creationId xmlns:a16="http://schemas.microsoft.com/office/drawing/2014/main" id="{5B680900-BB7C-D940-AE9C-CE6E80094A68}"/>
               </a:ext>
             </a:extLst>
           </p:cNvPr>
@@ -25655,8 +25481,8 @@
         </p:blipFill>
         <p:spPr>
           <a:xfrm>
-            <a:off x="4413314" y="1369218"/>
-            <a:ext cx="3886199" cy="3108959"/>
+            <a:off x="4244613" y="1268018"/>
+            <a:ext cx="3579633" cy="3272807"/>
           </a:xfrm>
           <a:prstGeom prst="rect">
             <a:avLst/>
@@ -25666,7 +25492,7 @@
     </p:spTree>
     <p:extLst>
       <p:ext uri="{BB962C8B-B14F-4D97-AF65-F5344CB8AC3E}">
-        <p14:creationId xmlns:p14="http://schemas.microsoft.com/office/powerpoint/2010/main" val="3826566874"/>
+        <p14:creationId xmlns:p14="http://schemas.microsoft.com/office/powerpoint/2010/main" val="3216247816"/>
       </p:ext>
     </p:extLst>
   </p:cSld>

</xml_diff>